<commit_message>
Login system with protected route added
</commit_message>
<xml_diff>
--- a/Day 45/Day 45 - Context API.pptx
+++ b/Day 45/Day 45 - Context API.pptx
@@ -201,7 +201,7 @@
           <a:p>
             <a:fld id="{0C596001-DCD7-B941-B7B7-335C0C37BE8D}" type="datetimeFigureOut">
               <a:rPr lang="en-US" smtClean="0"/>
-              <a:t>2/2/25</a:t>
+              <a:t>2/5/25</a:t>
             </a:fld>
             <a:endParaRPr lang="en-US"/>
           </a:p>
@@ -693,7 +693,7 @@
           <a:p>
             <a:fld id="{D29F4D1E-2136-1242-9FBF-7C2FA9BCF4E2}" type="datetimeFigureOut">
               <a:rPr lang="en-US" smtClean="0"/>
-              <a:t>2/2/25</a:t>
+              <a:t>2/5/25</a:t>
             </a:fld>
             <a:endParaRPr lang="en-US"/>
           </a:p>
@@ -931,7 +931,7 @@
           <a:p>
             <a:fld id="{D29F4D1E-2136-1242-9FBF-7C2FA9BCF4E2}" type="datetimeFigureOut">
               <a:rPr lang="en-US" smtClean="0"/>
-              <a:t>2/2/25</a:t>
+              <a:t>2/5/25</a:t>
             </a:fld>
             <a:endParaRPr lang="en-US"/>
           </a:p>
@@ -1770,7 +1770,7 @@
           <a:p>
             <a:fld id="{D29F4D1E-2136-1242-9FBF-7C2FA9BCF4E2}" type="datetimeFigureOut">
               <a:rPr lang="en-US" smtClean="0"/>
-              <a:t>2/2/25</a:t>
+              <a:t>2/5/25</a:t>
             </a:fld>
             <a:endParaRPr lang="en-US"/>
           </a:p>
@@ -2221,7 +2221,7 @@
           <a:p>
             <a:fld id="{D29F4D1E-2136-1242-9FBF-7C2FA9BCF4E2}" type="datetimeFigureOut">
               <a:rPr lang="en-US" smtClean="0"/>
-              <a:t>2/2/25</a:t>
+              <a:t>2/5/25</a:t>
             </a:fld>
             <a:endParaRPr lang="en-US"/>
           </a:p>
@@ -2394,7 +2394,7 @@
           <a:p>
             <a:fld id="{D29F4D1E-2136-1242-9FBF-7C2FA9BCF4E2}" type="datetimeFigureOut">
               <a:rPr lang="en-US" smtClean="0"/>
-              <a:t>2/2/25</a:t>
+              <a:t>2/5/25</a:t>
             </a:fld>
             <a:endParaRPr lang="en-US"/>
           </a:p>
@@ -2531,7 +2531,7 @@
           <a:p>
             <a:fld id="{D29F4D1E-2136-1242-9FBF-7C2FA9BCF4E2}" type="datetimeFigureOut">
               <a:rPr lang="en-US" smtClean="0"/>
-              <a:t>2/2/25</a:t>
+              <a:t>2/5/25</a:t>
             </a:fld>
             <a:endParaRPr lang="en-US"/>
           </a:p>
@@ -2875,7 +2875,7 @@
           <a:p>
             <a:fld id="{D29F4D1E-2136-1242-9FBF-7C2FA9BCF4E2}" type="datetimeFigureOut">
               <a:rPr lang="en-US" smtClean="0"/>
-              <a:t>2/2/25</a:t>
+              <a:t>2/5/25</a:t>
             </a:fld>
             <a:endParaRPr lang="en-US"/>
           </a:p>
@@ -3196,7 +3196,7 @@
           <a:p>
             <a:fld id="{D29F4D1E-2136-1242-9FBF-7C2FA9BCF4E2}" type="datetimeFigureOut">
               <a:rPr lang="en-US" smtClean="0"/>
-              <a:t>2/2/25</a:t>
+              <a:t>2/5/25</a:t>
             </a:fld>
             <a:endParaRPr lang="en-US"/>
           </a:p>
@@ -5459,7 +5459,7 @@
         <p:spPr>
           <a:xfrm>
             <a:off x="150724" y="743488"/>
-            <a:ext cx="10400045" cy="1291059"/>
+            <a:ext cx="10400045" cy="1706557"/>
           </a:xfrm>
           <a:prstGeom prst="rect">
             <a:avLst/>
@@ -5504,6 +5504,20 @@
               </a:rPr>
               <a:t>Allows user to “Broadcast” global state to the entire app.</a:t>
             </a:r>
+          </a:p>
+          <a:p>
+            <a:pPr marL="285750" indent="-285750">
+              <a:lnSpc>
+                <a:spcPct val="150000"/>
+              </a:lnSpc>
+              <a:buFont typeface="Arial" panose="020B0604020202020204" pitchFamily="34" charset="0"/>
+              <a:buChar char="•"/>
+            </a:pPr>
+            <a:endParaRPr lang="en-US" dirty="0">
+              <a:latin typeface="Menlo" panose="020B0609030804020204" pitchFamily="49" charset="0"/>
+              <a:ea typeface="Menlo" panose="020B0609030804020204" pitchFamily="49" charset="0"/>
+              <a:cs typeface="Menlo" panose="020B0609030804020204" pitchFamily="49" charset="0"/>
+            </a:endParaRPr>
           </a:p>
         </p:txBody>
       </p:sp>
@@ -5521,7 +5535,7 @@
         </p:nvSpPr>
         <p:spPr>
           <a:xfrm>
-            <a:off x="1557493" y="2780586"/>
+            <a:off x="2419643" y="2586236"/>
             <a:ext cx="7586506" cy="3333926"/>
           </a:xfrm>
           <a:prstGeom prst="rect">

</xml_diff>